<commit_message>
documentation update, Runtime menu moved
</commit_message>
<xml_diff>
--- a/QualiMasterApplication/documentation/architecture.pptx
+++ b/QualiMasterApplication/documentation/architecture.pptx
@@ -24,6 +24,7 @@
     <p:sldId id="272" r:id="rId18"/>
     <p:sldId id="269" r:id="rId19"/>
     <p:sldId id="273" r:id="rId20"/>
+    <p:sldId id="275" r:id="rId21"/>
   </p:sldIdLst>
   <p:sldSz cx="9144000" cy="6858000" type="screen4x3"/>
   <p:notesSz cx="6858000" cy="9144000"/>
@@ -307,7 +308,7 @@
             <a:fld id="{1D8BD707-D9CF-40AE-B4C6-C98DA3205C09}" type="datetimeFigureOut">
               <a:rPr lang="en-US" smtClean="0"/>
               <a:pPr/>
-              <a:t>8/4/2014</a:t>
+              <a:t>1/5/2016</a:t>
             </a:fld>
             <a:endParaRPr lang="en-US"/>
           </a:p>
@@ -474,7 +475,7 @@
             <a:fld id="{1D8BD707-D9CF-40AE-B4C6-C98DA3205C09}" type="datetimeFigureOut">
               <a:rPr lang="en-US" smtClean="0"/>
               <a:pPr/>
-              <a:t>8/4/2014</a:t>
+              <a:t>1/5/2016</a:t>
             </a:fld>
             <a:endParaRPr lang="en-US"/>
           </a:p>
@@ -651,7 +652,7 @@
             <a:fld id="{1D8BD707-D9CF-40AE-B4C6-C98DA3205C09}" type="datetimeFigureOut">
               <a:rPr lang="en-US" smtClean="0"/>
               <a:pPr/>
-              <a:t>8/4/2014</a:t>
+              <a:t>1/5/2016</a:t>
             </a:fld>
             <a:endParaRPr lang="en-US"/>
           </a:p>
@@ -818,7 +819,7 @@
             <a:fld id="{1D8BD707-D9CF-40AE-B4C6-C98DA3205C09}" type="datetimeFigureOut">
               <a:rPr lang="en-US" smtClean="0"/>
               <a:pPr/>
-              <a:t>8/4/2014</a:t>
+              <a:t>1/5/2016</a:t>
             </a:fld>
             <a:endParaRPr lang="en-US"/>
           </a:p>
@@ -1061,7 +1062,7 @@
             <a:fld id="{1D8BD707-D9CF-40AE-B4C6-C98DA3205C09}" type="datetimeFigureOut">
               <a:rPr lang="en-US" smtClean="0"/>
               <a:pPr/>
-              <a:t>8/4/2014</a:t>
+              <a:t>1/5/2016</a:t>
             </a:fld>
             <a:endParaRPr lang="en-US"/>
           </a:p>
@@ -1346,7 +1347,7 @@
             <a:fld id="{1D8BD707-D9CF-40AE-B4C6-C98DA3205C09}" type="datetimeFigureOut">
               <a:rPr lang="en-US" smtClean="0"/>
               <a:pPr/>
-              <a:t>8/4/2014</a:t>
+              <a:t>1/5/2016</a:t>
             </a:fld>
             <a:endParaRPr lang="en-US"/>
           </a:p>
@@ -1765,7 +1766,7 @@
             <a:fld id="{1D8BD707-D9CF-40AE-B4C6-C98DA3205C09}" type="datetimeFigureOut">
               <a:rPr lang="en-US" smtClean="0"/>
               <a:pPr/>
-              <a:t>8/4/2014</a:t>
+              <a:t>1/5/2016</a:t>
             </a:fld>
             <a:endParaRPr lang="en-US"/>
           </a:p>
@@ -1880,7 +1881,7 @@
             <a:fld id="{1D8BD707-D9CF-40AE-B4C6-C98DA3205C09}" type="datetimeFigureOut">
               <a:rPr lang="en-US" smtClean="0"/>
               <a:pPr/>
-              <a:t>8/4/2014</a:t>
+              <a:t>1/5/2016</a:t>
             </a:fld>
             <a:endParaRPr lang="en-US"/>
           </a:p>
@@ -1972,7 +1973,7 @@
             <a:fld id="{1D8BD707-D9CF-40AE-B4C6-C98DA3205C09}" type="datetimeFigureOut">
               <a:rPr lang="en-US" smtClean="0"/>
               <a:pPr/>
-              <a:t>8/4/2014</a:t>
+              <a:t>1/5/2016</a:t>
             </a:fld>
             <a:endParaRPr lang="en-US"/>
           </a:p>
@@ -2246,7 +2247,7 @@
             <a:fld id="{1D8BD707-D9CF-40AE-B4C6-C98DA3205C09}" type="datetimeFigureOut">
               <a:rPr lang="en-US" smtClean="0"/>
               <a:pPr/>
-              <a:t>8/4/2014</a:t>
+              <a:t>1/5/2016</a:t>
             </a:fld>
             <a:endParaRPr lang="en-US"/>
           </a:p>
@@ -2496,7 +2497,7 @@
             <a:fld id="{1D8BD707-D9CF-40AE-B4C6-C98DA3205C09}" type="datetimeFigureOut">
               <a:rPr lang="en-US" smtClean="0"/>
               <a:pPr/>
-              <a:t>8/4/2014</a:t>
+              <a:t>1/5/2016</a:t>
             </a:fld>
             <a:endParaRPr lang="en-US"/>
           </a:p>
@@ -2706,7 +2707,7 @@
             <a:fld id="{1D8BD707-D9CF-40AE-B4C6-C98DA3205C09}" type="datetimeFigureOut">
               <a:rPr lang="en-US" smtClean="0"/>
               <a:pPr/>
-              <a:t>8/4/2014</a:t>
+              <a:t>1/5/2016</a:t>
             </a:fld>
             <a:endParaRPr lang="en-US"/>
           </a:p>
@@ -5032,7 +5033,9 @@
         </p:nvSpPr>
         <p:spPr/>
         <p:txBody>
-          <a:bodyPr/>
+          <a:bodyPr>
+            <a:normAutofit lnSpcReduction="10000"/>
+          </a:bodyPr>
           <a:lstStyle/>
           <a:p>
             <a:r>
@@ -5055,7 +5058,21 @@
           <a:p>
             <a:r>
               <a:rPr lang="en-US" dirty="0" smtClean="0"/>
-              <a:t>Tree view, editors, pipeline editors and tabbed views communicate in terms of changes</a:t>
+              <a:t>Tree view, editors, pipeline editors and tabbed views communicate in terms of </a:t>
+            </a:r>
+            <a:r>
+              <a:rPr lang="en-US" dirty="0" smtClean="0"/>
+              <a:t>changes</a:t>
+            </a:r>
+          </a:p>
+          <a:p>
+            <a:r>
+              <a:rPr lang="en-US" noProof="0" dirty="0" smtClean="0"/>
+              <a:t>Similar mechanism for infrastructure </a:t>
+            </a:r>
+            <a:r>
+              <a:rPr lang="en-US" noProof="0" dirty="0" err="1" smtClean="0"/>
+              <a:t>connetion</a:t>
             </a:r>
             <a:endParaRPr lang="en-US" noProof="0" dirty="0"/>
           </a:p>
@@ -8670,6 +8687,111 @@
 </p:sld>
 </file>
 
+<file path=ppt/slides/slide20.xml><?xml version="1.0" encoding="utf-8"?>
+<p:sld xmlns:a="http://schemas.openxmlformats.org/drawingml/2006/main" xmlns:r="http://schemas.openxmlformats.org/officeDocument/2006/relationships" xmlns:p="http://schemas.openxmlformats.org/presentationml/2006/main">
+  <p:cSld>
+    <p:spTree>
+      <p:nvGrpSpPr>
+        <p:cNvPr id="1" name=""/>
+        <p:cNvGrpSpPr/>
+        <p:nvPr/>
+      </p:nvGrpSpPr>
+      <p:grpSpPr>
+        <a:xfrm>
+          <a:off x="0" y="0"/>
+          <a:ext cx="0" cy="0"/>
+          <a:chOff x="0" y="0"/>
+          <a:chExt cx="0" cy="0"/>
+        </a:xfrm>
+      </p:grpSpPr>
+      <p:sp>
+        <p:nvSpPr>
+          <p:cNvPr id="2" name="Title 1"/>
+          <p:cNvSpPr>
+            <a:spLocks noGrp="1"/>
+          </p:cNvSpPr>
+          <p:nvPr>
+            <p:ph type="title"/>
+          </p:nvPr>
+        </p:nvSpPr>
+        <p:spPr/>
+        <p:txBody>
+          <a:bodyPr/>
+          <a:lstStyle/>
+          <a:p>
+            <a:r>
+              <a:rPr lang="en-US" noProof="0" dirty="0" smtClean="0"/>
+              <a:t>Infrastructure Connection</a:t>
+            </a:r>
+            <a:endParaRPr lang="en-US" noProof="0" dirty="0"/>
+          </a:p>
+        </p:txBody>
+      </p:sp>
+      <p:sp>
+        <p:nvSpPr>
+          <p:cNvPr id="3" name="Content Placeholder 2"/>
+          <p:cNvSpPr>
+            <a:spLocks noGrp="1"/>
+          </p:cNvSpPr>
+          <p:nvPr>
+            <p:ph idx="1"/>
+          </p:nvPr>
+        </p:nvSpPr>
+        <p:spPr/>
+        <p:txBody>
+          <a:bodyPr>
+            <a:normAutofit/>
+          </a:bodyPr>
+          <a:lstStyle/>
+          <a:p>
+            <a:r>
+              <a:rPr lang="en-US" noProof="0" dirty="0" smtClean="0"/>
+              <a:t>Central connection instance</a:t>
+            </a:r>
+          </a:p>
+          <a:p>
+            <a:r>
+              <a:rPr lang="en-US" dirty="0" smtClean="0"/>
+              <a:t>Purpose: @Runtime</a:t>
+            </a:r>
+          </a:p>
+          <a:p>
+            <a:pPr lvl="1"/>
+            <a:r>
+              <a:rPr lang="en-US" dirty="0" smtClean="0"/>
+              <a:t>Send commands to infrastructure</a:t>
+            </a:r>
+          </a:p>
+          <a:p>
+            <a:pPr lvl="1"/>
+            <a:r>
+              <a:rPr lang="en-US" noProof="0" dirty="0" smtClean="0"/>
+              <a:t>Receive information from infrastructure</a:t>
+            </a:r>
+          </a:p>
+          <a:p>
+            <a:r>
+              <a:rPr lang="en-US" dirty="0" smtClean="0"/>
+              <a:t>Handles multiple registered dispatchers </a:t>
+            </a:r>
+          </a:p>
+          <a:p>
+            <a:r>
+              <a:rPr lang="en-US" noProof="0" dirty="0" smtClean="0"/>
+              <a:t>Informs multiple registered listeners</a:t>
+            </a:r>
+            <a:endParaRPr lang="en-US" noProof="0" dirty="0"/>
+          </a:p>
+        </p:txBody>
+      </p:sp>
+    </p:spTree>
+  </p:cSld>
+  <p:clrMapOvr>
+    <a:masterClrMapping/>
+  </p:clrMapOvr>
+</p:sld>
+</file>
+
 <file path=ppt/slides/slide3.xml><?xml version="1.0" encoding="utf-8"?>
 <p:sld xmlns:a="http://schemas.openxmlformats.org/drawingml/2006/main" xmlns:r="http://schemas.openxmlformats.org/officeDocument/2006/relationships" xmlns:p="http://schemas.openxmlformats.org/presentationml/2006/main">
   <p:cSld>
@@ -9494,8 +9616,8 @@
         </p:nvSpPr>
         <p:spPr>
           <a:xfrm>
-            <a:off x="838200" y="5334000"/>
-            <a:ext cx="7620000" cy="914400"/>
+            <a:off x="369332" y="5334000"/>
+            <a:ext cx="8698468" cy="914400"/>
           </a:xfrm>
           <a:prstGeom prst="rect">
             <a:avLst/>
@@ -9540,8 +9662,8 @@
         </p:nvSpPr>
         <p:spPr>
           <a:xfrm>
-            <a:off x="838200" y="4343400"/>
-            <a:ext cx="6096000" cy="914400"/>
+            <a:off x="369333" y="4343400"/>
+            <a:ext cx="5802867" cy="914400"/>
           </a:xfrm>
           <a:prstGeom prst="rect">
             <a:avLst/>
@@ -9582,7 +9704,7 @@
         </p:nvSpPr>
         <p:spPr>
           <a:xfrm>
-            <a:off x="838200" y="3352800"/>
+            <a:off x="369333" y="3352800"/>
             <a:ext cx="1143000" cy="914400"/>
           </a:xfrm>
           <a:prstGeom prst="rect">
@@ -9624,7 +9746,7 @@
         </p:nvSpPr>
         <p:spPr>
           <a:xfrm>
-            <a:off x="2057400" y="3352800"/>
+            <a:off x="1588533" y="3352800"/>
             <a:ext cx="1447800" cy="914400"/>
           </a:xfrm>
           <a:prstGeom prst="rect">
@@ -9666,7 +9788,7 @@
         </p:nvSpPr>
         <p:spPr>
           <a:xfrm>
-            <a:off x="5105400" y="3352800"/>
+            <a:off x="5715000" y="3352800"/>
             <a:ext cx="914400" cy="914400"/>
           </a:xfrm>
           <a:prstGeom prst="rect">
@@ -9708,7 +9830,7 @@
         </p:nvSpPr>
         <p:spPr>
           <a:xfrm>
-            <a:off x="7467600" y="3352800"/>
+            <a:off x="8077200" y="3352800"/>
             <a:ext cx="990600" cy="914400"/>
           </a:xfrm>
           <a:prstGeom prst="rect">
@@ -9750,7 +9872,7 @@
         </p:nvSpPr>
         <p:spPr>
           <a:xfrm>
-            <a:off x="6096000" y="3352800"/>
+            <a:off x="6705600" y="3352800"/>
             <a:ext cx="1295400" cy="914400"/>
           </a:xfrm>
           <a:prstGeom prst="rect">
@@ -9792,8 +9914,8 @@
         </p:nvSpPr>
         <p:spPr>
           <a:xfrm>
-            <a:off x="7010400" y="4343400"/>
-            <a:ext cx="1447800" cy="914400"/>
+            <a:off x="6248400" y="4343400"/>
+            <a:ext cx="2819400" cy="914400"/>
           </a:xfrm>
           <a:prstGeom prst="rect">
             <a:avLst/>
@@ -9842,7 +9964,7 @@
         </p:nvSpPr>
         <p:spPr>
           <a:xfrm>
-            <a:off x="3581400" y="3352800"/>
+            <a:off x="3112533" y="3352800"/>
             <a:ext cx="1447800" cy="914400"/>
           </a:xfrm>
           <a:prstGeom prst="rect">
@@ -9886,13 +10008,471 @@
       </p:sp>
       <p:sp>
         <p:nvSpPr>
+          <p:cNvPr id="15" name="Left Brace 14"/>
+          <p:cNvSpPr/>
+          <p:nvPr/>
+        </p:nvSpPr>
+        <p:spPr>
+          <a:xfrm>
+            <a:off x="64533" y="3352800"/>
+            <a:ext cx="152400" cy="1905000"/>
+          </a:xfrm>
+          <a:prstGeom prst="leftBrace">
+            <a:avLst/>
+          </a:prstGeom>
+        </p:spPr>
+        <p:style>
+          <a:lnRef idx="1">
+            <a:schemeClr val="accent1"/>
+          </a:lnRef>
+          <a:fillRef idx="0">
+            <a:schemeClr val="accent1"/>
+          </a:fillRef>
+          <a:effectRef idx="0">
+            <a:schemeClr val="accent1"/>
+          </a:effectRef>
+          <a:fontRef idx="minor">
+            <a:schemeClr val="tx1"/>
+          </a:fontRef>
+        </p:style>
+        <p:txBody>
+          <a:bodyPr rtlCol="0" anchor="ctr"/>
+          <a:lstStyle/>
+          <a:p>
+            <a:pPr algn="ctr"/>
+            <a:endParaRPr lang="de-DE"/>
+          </a:p>
+        </p:txBody>
+      </p:sp>
+      <p:sp>
+        <p:nvSpPr>
+          <p:cNvPr id="16" name="TextBox 15"/>
+          <p:cNvSpPr txBox="1"/>
+          <p:nvPr/>
+        </p:nvSpPr>
+        <p:spPr>
+          <a:xfrm rot="16200000">
+            <a:off x="-630106" y="4135307"/>
+            <a:ext cx="867545" cy="369332"/>
+          </a:xfrm>
+          <a:prstGeom prst="rect">
+            <a:avLst/>
+          </a:prstGeom>
+          <a:noFill/>
+        </p:spPr>
+        <p:txBody>
+          <a:bodyPr wrap="none" rtlCol="0">
+            <a:spAutoFit/>
+          </a:bodyPr>
+          <a:lstStyle/>
+          <a:p>
+            <a:r>
+              <a:rPr lang="de-DE" dirty="0" err="1" smtClean="0"/>
+              <a:t>qmApp</a:t>
+            </a:r>
+            <a:endParaRPr lang="de-DE" dirty="0"/>
+          </a:p>
+        </p:txBody>
+      </p:sp>
+      <p:sp>
+        <p:nvSpPr>
+          <p:cNvPr id="17" name="TextBox 16"/>
+          <p:cNvSpPr txBox="1"/>
+          <p:nvPr/>
+        </p:nvSpPr>
+        <p:spPr>
+          <a:xfrm rot="16200000">
+            <a:off x="-190671" y="1742473"/>
+            <a:ext cx="2150076" cy="646331"/>
+          </a:xfrm>
+          <a:prstGeom prst="rect">
+            <a:avLst/>
+          </a:prstGeom>
+          <a:noFill/>
+        </p:spPr>
+        <p:txBody>
+          <a:bodyPr wrap="none" rtlCol="0">
+            <a:spAutoFit/>
+          </a:bodyPr>
+          <a:lstStyle/>
+          <a:p>
+            <a:r>
+              <a:rPr lang="de-DE" dirty="0" smtClean="0"/>
+              <a:t>The </a:t>
+            </a:r>
+            <a:r>
+              <a:rPr lang="de-DE" dirty="0" err="1" smtClean="0"/>
+              <a:t>configurable</a:t>
+            </a:r>
+            <a:r>
+              <a:rPr lang="de-DE" dirty="0" smtClean="0"/>
+              <a:t/>
+            </a:r>
+            <a:br>
+              <a:rPr lang="de-DE" dirty="0" smtClean="0"/>
+            </a:br>
+            <a:r>
+              <a:rPr lang="de-DE" dirty="0" err="1" smtClean="0"/>
+              <a:t>elements</a:t>
+            </a:r>
+            <a:r>
+              <a:rPr lang="de-DE" dirty="0" smtClean="0"/>
+              <a:t> </a:t>
+            </a:r>
+            <a:r>
+              <a:rPr lang="de-DE" dirty="0" err="1" smtClean="0"/>
+              <a:t>tree</a:t>
+            </a:r>
+            <a:r>
+              <a:rPr lang="de-DE" dirty="0" smtClean="0"/>
+              <a:t> + </a:t>
+            </a:r>
+            <a:r>
+              <a:rPr lang="de-DE" dirty="0" err="1" smtClean="0"/>
+              <a:t>view</a:t>
+            </a:r>
+            <a:endParaRPr lang="de-DE" dirty="0"/>
+          </a:p>
+        </p:txBody>
+      </p:sp>
+      <p:sp>
+        <p:nvSpPr>
+          <p:cNvPr id="18" name="TextBox 17"/>
+          <p:cNvSpPr txBox="1"/>
+          <p:nvPr/>
+        </p:nvSpPr>
+        <p:spPr>
+          <a:xfrm rot="16200000">
+            <a:off x="1474252" y="1850405"/>
+            <a:ext cx="1609095" cy="923330"/>
+          </a:xfrm>
+          <a:prstGeom prst="rect">
+            <a:avLst/>
+          </a:prstGeom>
+          <a:noFill/>
+        </p:spPr>
+        <p:txBody>
+          <a:bodyPr wrap="none" rtlCol="0">
+            <a:spAutoFit/>
+          </a:bodyPr>
+          <a:lstStyle/>
+          <a:p>
+            <a:r>
+              <a:rPr lang="de-DE" dirty="0" smtClean="0"/>
+              <a:t>Pipeline </a:t>
+            </a:r>
+            <a:r>
+              <a:rPr lang="de-DE" dirty="0" err="1" smtClean="0"/>
+              <a:t>editor</a:t>
+            </a:r>
+            <a:r>
+              <a:rPr lang="de-DE" dirty="0" smtClean="0"/>
+              <a:t> </a:t>
+            </a:r>
+            <a:br>
+              <a:rPr lang="de-DE" dirty="0" smtClean="0"/>
+            </a:br>
+            <a:r>
+              <a:rPr lang="de-DE" dirty="0" err="1" smtClean="0"/>
+              <a:t>integration</a:t>
+            </a:r>
+            <a:r>
+              <a:rPr lang="de-DE" dirty="0" smtClean="0"/>
+              <a:t> via </a:t>
+            </a:r>
+            <a:br>
+              <a:rPr lang="de-DE" dirty="0" smtClean="0"/>
+            </a:br>
+            <a:r>
+              <a:rPr lang="de-DE" dirty="0" err="1" smtClean="0"/>
+              <a:t>tabbed</a:t>
+            </a:r>
+            <a:r>
+              <a:rPr lang="de-DE" dirty="0" smtClean="0"/>
+              <a:t> </a:t>
+            </a:r>
+            <a:r>
+              <a:rPr lang="de-DE" dirty="0" err="1" smtClean="0"/>
+              <a:t>views</a:t>
+            </a:r>
+            <a:endParaRPr lang="de-DE" dirty="0"/>
+          </a:p>
+        </p:txBody>
+      </p:sp>
+      <p:sp>
+        <p:nvSpPr>
+          <p:cNvPr id="19" name="TextBox 18"/>
+          <p:cNvSpPr txBox="1"/>
+          <p:nvPr/>
+        </p:nvSpPr>
+        <p:spPr>
+          <a:xfrm rot="16200000">
+            <a:off x="3012151" y="1980009"/>
+            <a:ext cx="1609095" cy="646331"/>
+          </a:xfrm>
+          <a:prstGeom prst="rect">
+            <a:avLst/>
+          </a:prstGeom>
+          <a:noFill/>
+        </p:spPr>
+        <p:txBody>
+          <a:bodyPr wrap="none" rtlCol="0">
+            <a:spAutoFit/>
+          </a:bodyPr>
+          <a:lstStyle/>
+          <a:p>
+            <a:r>
+              <a:rPr lang="de-DE" dirty="0" smtClean="0"/>
+              <a:t>The </a:t>
+            </a:r>
+            <a:r>
+              <a:rPr lang="de-DE" dirty="0" err="1" smtClean="0"/>
+              <a:t>generated</a:t>
+            </a:r>
+            <a:r>
+              <a:rPr lang="de-DE" dirty="0" smtClean="0"/>
+              <a:t> </a:t>
+            </a:r>
+            <a:br>
+              <a:rPr lang="de-DE" dirty="0" smtClean="0"/>
+            </a:br>
+            <a:r>
+              <a:rPr lang="de-DE" dirty="0" smtClean="0"/>
+              <a:t>Pipeline </a:t>
+            </a:r>
+            <a:r>
+              <a:rPr lang="de-DE" dirty="0" err="1" smtClean="0"/>
+              <a:t>editor</a:t>
+            </a:r>
+            <a:r>
+              <a:rPr lang="de-DE" dirty="0" smtClean="0"/>
+              <a:t> </a:t>
+            </a:r>
+            <a:endParaRPr lang="de-DE" dirty="0"/>
+          </a:p>
+        </p:txBody>
+      </p:sp>
+      <p:sp>
+        <p:nvSpPr>
+          <p:cNvPr id="20" name="TextBox 19"/>
+          <p:cNvSpPr txBox="1"/>
+          <p:nvPr/>
+        </p:nvSpPr>
+        <p:spPr>
+          <a:xfrm rot="16200000">
+            <a:off x="5306349" y="1916173"/>
+            <a:ext cx="1768433" cy="646331"/>
+          </a:xfrm>
+          <a:prstGeom prst="rect">
+            <a:avLst/>
+          </a:prstGeom>
+          <a:noFill/>
+        </p:spPr>
+        <p:txBody>
+          <a:bodyPr wrap="none" rtlCol="0">
+            <a:spAutoFit/>
+          </a:bodyPr>
+          <a:lstStyle/>
+          <a:p>
+            <a:r>
+              <a:rPr lang="de-DE" dirty="0" err="1" smtClean="0"/>
+              <a:t>Variability</a:t>
+            </a:r>
+            <a:r>
+              <a:rPr lang="de-DE" dirty="0" smtClean="0"/>
+              <a:t> model</a:t>
+            </a:r>
+            <a:br>
+              <a:rPr lang="de-DE" dirty="0" smtClean="0"/>
+            </a:br>
+            <a:r>
+              <a:rPr lang="de-DE" dirty="0" err="1" smtClean="0"/>
+              <a:t>editors</a:t>
+            </a:r>
+            <a:r>
+              <a:rPr lang="de-DE" dirty="0" smtClean="0"/>
+              <a:t> / </a:t>
+            </a:r>
+            <a:r>
+              <a:rPr lang="de-DE" dirty="0" err="1" smtClean="0"/>
+              <a:t>input</a:t>
+            </a:r>
+            <a:endParaRPr lang="de-DE" dirty="0"/>
+          </a:p>
+        </p:txBody>
+      </p:sp>
+      <p:sp>
+        <p:nvSpPr>
+          <p:cNvPr id="21" name="TextBox 20"/>
+          <p:cNvSpPr txBox="1"/>
+          <p:nvPr/>
+        </p:nvSpPr>
+        <p:spPr>
+          <a:xfrm rot="16200000">
+            <a:off x="6421458" y="1978472"/>
+            <a:ext cx="1824217" cy="369332"/>
+          </a:xfrm>
+          <a:prstGeom prst="rect">
+            <a:avLst/>
+          </a:prstGeom>
+          <a:noFill/>
+        </p:spPr>
+        <p:txBody>
+          <a:bodyPr wrap="none" rtlCol="0">
+            <a:spAutoFit/>
+          </a:bodyPr>
+          <a:lstStyle/>
+          <a:p>
+            <a:r>
+              <a:rPr lang="de-DE" dirty="0" smtClean="0"/>
+              <a:t>Menu </a:t>
+            </a:r>
+            <a:r>
+              <a:rPr lang="de-DE" dirty="0" err="1" smtClean="0"/>
+              <a:t>commands</a:t>
+            </a:r>
+            <a:endParaRPr lang="de-DE" dirty="0"/>
+          </a:p>
+        </p:txBody>
+      </p:sp>
+      <p:sp>
+        <p:nvSpPr>
+          <p:cNvPr id="22" name="TextBox 21"/>
+          <p:cNvSpPr txBox="1"/>
+          <p:nvPr/>
+        </p:nvSpPr>
+        <p:spPr>
+          <a:xfrm rot="16200000">
+            <a:off x="7601499" y="1930165"/>
+            <a:ext cx="1930337" cy="369332"/>
+          </a:xfrm>
+          <a:prstGeom prst="rect">
+            <a:avLst/>
+          </a:prstGeom>
+          <a:noFill/>
+        </p:spPr>
+        <p:txBody>
+          <a:bodyPr wrap="none" rtlCol="0">
+            <a:spAutoFit/>
+          </a:bodyPr>
+          <a:lstStyle/>
+          <a:p>
+            <a:r>
+              <a:rPr lang="de-DE" dirty="0" err="1" smtClean="0"/>
+              <a:t>Supporting</a:t>
+            </a:r>
+            <a:r>
+              <a:rPr lang="de-DE" dirty="0" smtClean="0"/>
+              <a:t> </a:t>
+            </a:r>
+            <a:r>
+              <a:rPr lang="de-DE" dirty="0" err="1" smtClean="0"/>
+              <a:t>dialogs</a:t>
+            </a:r>
+            <a:endParaRPr lang="de-DE" dirty="0"/>
+          </a:p>
+        </p:txBody>
+      </p:sp>
+      <p:sp>
+        <p:nvSpPr>
+          <p:cNvPr id="23" name="Rectangle 22"/>
+          <p:cNvSpPr/>
+          <p:nvPr/>
+        </p:nvSpPr>
+        <p:spPr>
+          <a:xfrm>
+            <a:off x="4648200" y="3352800"/>
+            <a:ext cx="990600" cy="914400"/>
+          </a:xfrm>
+          <a:prstGeom prst="rect">
+            <a:avLst/>
+          </a:prstGeom>
+        </p:spPr>
+        <p:style>
+          <a:lnRef idx="0">
+            <a:schemeClr val="accent4"/>
+          </a:lnRef>
+          <a:fillRef idx="3">
+            <a:schemeClr val="accent4"/>
+          </a:fillRef>
+          <a:effectRef idx="3">
+            <a:schemeClr val="accent4"/>
+          </a:effectRef>
+          <a:fontRef idx="minor">
+            <a:schemeClr val="lt1"/>
+          </a:fontRef>
+        </p:style>
+        <p:txBody>
+          <a:bodyPr rtlCol="0" anchor="ctr"/>
+          <a:lstStyle/>
+          <a:p>
+            <a:pPr algn="ctr"/>
+            <a:r>
+              <a:rPr lang="de-DE" dirty="0" err="1" smtClean="0"/>
+              <a:t>runtime</a:t>
+            </a:r>
+            <a:endParaRPr lang="de-DE" dirty="0"/>
+          </a:p>
+        </p:txBody>
+      </p:sp>
+      <p:sp>
+        <p:nvSpPr>
+          <p:cNvPr id="24" name="TextBox 23"/>
+          <p:cNvSpPr txBox="1"/>
+          <p:nvPr/>
+        </p:nvSpPr>
+        <p:spPr>
+          <a:xfrm rot="16200000">
+            <a:off x="3964313" y="1674487"/>
+            <a:ext cx="2318905" cy="646331"/>
+          </a:xfrm>
+          <a:prstGeom prst="rect">
+            <a:avLst/>
+          </a:prstGeom>
+          <a:noFill/>
+        </p:spPr>
+        <p:txBody>
+          <a:bodyPr wrap="none" rtlCol="0">
+            <a:spAutoFit/>
+          </a:bodyPr>
+          <a:lstStyle/>
+          <a:p>
+            <a:r>
+              <a:rPr lang="de-DE" dirty="0" err="1" smtClean="0"/>
+              <a:t>Runtime</a:t>
+            </a:r>
+            <a:r>
+              <a:rPr lang="de-DE" dirty="0" smtClean="0"/>
+              <a:t> </a:t>
+            </a:r>
+            <a:r>
+              <a:rPr lang="de-DE" dirty="0" err="1" smtClean="0"/>
+              <a:t>infrastructure</a:t>
+            </a:r>
+            <a:r>
+              <a:rPr lang="de-DE" dirty="0" smtClean="0"/>
+              <a:t/>
+            </a:r>
+            <a:br>
+              <a:rPr lang="de-DE" dirty="0" smtClean="0"/>
+            </a:br>
+            <a:r>
+              <a:rPr lang="de-DE" dirty="0" err="1" smtClean="0"/>
+              <a:t>connection</a:t>
+            </a:r>
+            <a:endParaRPr lang="de-DE" dirty="0"/>
+          </a:p>
+        </p:txBody>
+      </p:sp>
+      <p:sp>
+        <p:nvSpPr>
           <p:cNvPr id="14" name="Rectangle 13"/>
           <p:cNvSpPr/>
           <p:nvPr/>
         </p:nvSpPr>
         <p:spPr>
           <a:xfrm>
-            <a:off x="1447800" y="4114800"/>
+            <a:off x="978933" y="4114800"/>
             <a:ext cx="4114800" cy="381000"/>
           </a:xfrm>
           <a:prstGeom prst="rect">
@@ -9925,373 +10505,6 @@
             <a:r>
               <a:rPr lang="de-DE" dirty="0" err="1" smtClean="0"/>
               <a:t>management</a:t>
-            </a:r>
-            <a:endParaRPr lang="de-DE" dirty="0"/>
-          </a:p>
-        </p:txBody>
-      </p:sp>
-      <p:sp>
-        <p:nvSpPr>
-          <p:cNvPr id="15" name="Left Brace 14"/>
-          <p:cNvSpPr/>
-          <p:nvPr/>
-        </p:nvSpPr>
-        <p:spPr>
-          <a:xfrm>
-            <a:off x="533400" y="3352800"/>
-            <a:ext cx="152400" cy="1905000"/>
-          </a:xfrm>
-          <a:prstGeom prst="leftBrace">
-            <a:avLst/>
-          </a:prstGeom>
-        </p:spPr>
-        <p:style>
-          <a:lnRef idx="1">
-            <a:schemeClr val="accent1"/>
-          </a:lnRef>
-          <a:fillRef idx="0">
-            <a:schemeClr val="accent1"/>
-          </a:fillRef>
-          <a:effectRef idx="0">
-            <a:schemeClr val="accent1"/>
-          </a:effectRef>
-          <a:fontRef idx="minor">
-            <a:schemeClr val="tx1"/>
-          </a:fontRef>
-        </p:style>
-        <p:txBody>
-          <a:bodyPr rtlCol="0" anchor="ctr"/>
-          <a:lstStyle/>
-          <a:p>
-            <a:pPr algn="ctr"/>
-            <a:endParaRPr lang="de-DE"/>
-          </a:p>
-        </p:txBody>
-      </p:sp>
-      <p:sp>
-        <p:nvSpPr>
-          <p:cNvPr id="16" name="TextBox 15"/>
-          <p:cNvSpPr txBox="1"/>
-          <p:nvPr/>
-        </p:nvSpPr>
-        <p:spPr>
-          <a:xfrm rot="16200000">
-            <a:off x="-161239" y="4135307"/>
-            <a:ext cx="867545" cy="369332"/>
-          </a:xfrm>
-          <a:prstGeom prst="rect">
-            <a:avLst/>
-          </a:prstGeom>
-          <a:noFill/>
-        </p:spPr>
-        <p:txBody>
-          <a:bodyPr wrap="none" rtlCol="0">
-            <a:spAutoFit/>
-          </a:bodyPr>
-          <a:lstStyle/>
-          <a:p>
-            <a:r>
-              <a:rPr lang="de-DE" dirty="0" err="1" smtClean="0"/>
-              <a:t>qmApp</a:t>
-            </a:r>
-            <a:endParaRPr lang="de-DE" dirty="0"/>
-          </a:p>
-        </p:txBody>
-      </p:sp>
-      <p:sp>
-        <p:nvSpPr>
-          <p:cNvPr id="17" name="TextBox 16"/>
-          <p:cNvSpPr txBox="1"/>
-          <p:nvPr/>
-        </p:nvSpPr>
-        <p:spPr>
-          <a:xfrm rot="16200000">
-            <a:off x="278196" y="1742473"/>
-            <a:ext cx="2150076" cy="646331"/>
-          </a:xfrm>
-          <a:prstGeom prst="rect">
-            <a:avLst/>
-          </a:prstGeom>
-          <a:noFill/>
-        </p:spPr>
-        <p:txBody>
-          <a:bodyPr wrap="none" rtlCol="0">
-            <a:spAutoFit/>
-          </a:bodyPr>
-          <a:lstStyle/>
-          <a:p>
-            <a:r>
-              <a:rPr lang="de-DE" dirty="0" smtClean="0"/>
-              <a:t>The </a:t>
-            </a:r>
-            <a:r>
-              <a:rPr lang="de-DE" dirty="0" err="1" smtClean="0"/>
-              <a:t>configurable</a:t>
-            </a:r>
-            <a:r>
-              <a:rPr lang="de-DE" dirty="0" smtClean="0"/>
-              <a:t/>
-            </a:r>
-            <a:br>
-              <a:rPr lang="de-DE" dirty="0" smtClean="0"/>
-            </a:br>
-            <a:r>
-              <a:rPr lang="de-DE" dirty="0" err="1" smtClean="0"/>
-              <a:t>elements</a:t>
-            </a:r>
-            <a:r>
-              <a:rPr lang="de-DE" dirty="0" smtClean="0"/>
-              <a:t> </a:t>
-            </a:r>
-            <a:r>
-              <a:rPr lang="de-DE" dirty="0" err="1" smtClean="0"/>
-              <a:t>tree</a:t>
-            </a:r>
-            <a:r>
-              <a:rPr lang="de-DE" dirty="0" smtClean="0"/>
-              <a:t> + </a:t>
-            </a:r>
-            <a:r>
-              <a:rPr lang="de-DE" dirty="0" err="1" smtClean="0"/>
-              <a:t>view</a:t>
-            </a:r>
-            <a:endParaRPr lang="de-DE" dirty="0"/>
-          </a:p>
-        </p:txBody>
-      </p:sp>
-      <p:sp>
-        <p:nvSpPr>
-          <p:cNvPr id="18" name="TextBox 17"/>
-          <p:cNvSpPr txBox="1"/>
-          <p:nvPr/>
-        </p:nvSpPr>
-        <p:spPr>
-          <a:xfrm rot="16200000">
-            <a:off x="1943119" y="1850405"/>
-            <a:ext cx="1609095" cy="923330"/>
-          </a:xfrm>
-          <a:prstGeom prst="rect">
-            <a:avLst/>
-          </a:prstGeom>
-          <a:noFill/>
-        </p:spPr>
-        <p:txBody>
-          <a:bodyPr wrap="none" rtlCol="0">
-            <a:spAutoFit/>
-          </a:bodyPr>
-          <a:lstStyle/>
-          <a:p>
-            <a:r>
-              <a:rPr lang="de-DE" dirty="0" smtClean="0"/>
-              <a:t>Pipeline </a:t>
-            </a:r>
-            <a:r>
-              <a:rPr lang="de-DE" dirty="0" err="1" smtClean="0"/>
-              <a:t>editor</a:t>
-            </a:r>
-            <a:r>
-              <a:rPr lang="de-DE" dirty="0" smtClean="0"/>
-              <a:t> </a:t>
-            </a:r>
-            <a:br>
-              <a:rPr lang="de-DE" dirty="0" smtClean="0"/>
-            </a:br>
-            <a:r>
-              <a:rPr lang="de-DE" dirty="0" err="1" smtClean="0"/>
-              <a:t>integration</a:t>
-            </a:r>
-            <a:r>
-              <a:rPr lang="de-DE" dirty="0" smtClean="0"/>
-              <a:t> via </a:t>
-            </a:r>
-            <a:br>
-              <a:rPr lang="de-DE" dirty="0" smtClean="0"/>
-            </a:br>
-            <a:r>
-              <a:rPr lang="de-DE" dirty="0" err="1" smtClean="0"/>
-              <a:t>tabbed</a:t>
-            </a:r>
-            <a:r>
-              <a:rPr lang="de-DE" dirty="0" smtClean="0"/>
-              <a:t> </a:t>
-            </a:r>
-            <a:r>
-              <a:rPr lang="de-DE" dirty="0" err="1" smtClean="0"/>
-              <a:t>views</a:t>
-            </a:r>
-            <a:endParaRPr lang="de-DE" dirty="0"/>
-          </a:p>
-        </p:txBody>
-      </p:sp>
-      <p:sp>
-        <p:nvSpPr>
-          <p:cNvPr id="19" name="TextBox 18"/>
-          <p:cNvSpPr txBox="1"/>
-          <p:nvPr/>
-        </p:nvSpPr>
-        <p:spPr>
-          <a:xfrm rot="16200000">
-            <a:off x="3481018" y="1980009"/>
-            <a:ext cx="1609095" cy="646331"/>
-          </a:xfrm>
-          <a:prstGeom prst="rect">
-            <a:avLst/>
-          </a:prstGeom>
-          <a:noFill/>
-        </p:spPr>
-        <p:txBody>
-          <a:bodyPr wrap="none" rtlCol="0">
-            <a:spAutoFit/>
-          </a:bodyPr>
-          <a:lstStyle/>
-          <a:p>
-            <a:r>
-              <a:rPr lang="de-DE" dirty="0" smtClean="0"/>
-              <a:t>The </a:t>
-            </a:r>
-            <a:r>
-              <a:rPr lang="de-DE" dirty="0" err="1" smtClean="0"/>
-              <a:t>generated</a:t>
-            </a:r>
-            <a:r>
-              <a:rPr lang="de-DE" dirty="0" smtClean="0"/>
-              <a:t> </a:t>
-            </a:r>
-            <a:br>
-              <a:rPr lang="de-DE" dirty="0" smtClean="0"/>
-            </a:br>
-            <a:r>
-              <a:rPr lang="de-DE" dirty="0" smtClean="0"/>
-              <a:t>Pipeline </a:t>
-            </a:r>
-            <a:r>
-              <a:rPr lang="de-DE" dirty="0" err="1" smtClean="0"/>
-              <a:t>editor</a:t>
-            </a:r>
-            <a:r>
-              <a:rPr lang="de-DE" dirty="0" smtClean="0"/>
-              <a:t> </a:t>
-            </a:r>
-            <a:endParaRPr lang="de-DE" dirty="0"/>
-          </a:p>
-        </p:txBody>
-      </p:sp>
-      <p:sp>
-        <p:nvSpPr>
-          <p:cNvPr id="20" name="TextBox 19"/>
-          <p:cNvSpPr txBox="1"/>
-          <p:nvPr/>
-        </p:nvSpPr>
-        <p:spPr>
-          <a:xfrm rot="16200000">
-            <a:off x="4696749" y="1916173"/>
-            <a:ext cx="1768433" cy="646331"/>
-          </a:xfrm>
-          <a:prstGeom prst="rect">
-            <a:avLst/>
-          </a:prstGeom>
-          <a:noFill/>
-        </p:spPr>
-        <p:txBody>
-          <a:bodyPr wrap="none" rtlCol="0">
-            <a:spAutoFit/>
-          </a:bodyPr>
-          <a:lstStyle/>
-          <a:p>
-            <a:r>
-              <a:rPr lang="de-DE" dirty="0" err="1" smtClean="0"/>
-              <a:t>Variability</a:t>
-            </a:r>
-            <a:r>
-              <a:rPr lang="de-DE" dirty="0" smtClean="0"/>
-              <a:t> model</a:t>
-            </a:r>
-            <a:br>
-              <a:rPr lang="de-DE" dirty="0" smtClean="0"/>
-            </a:br>
-            <a:r>
-              <a:rPr lang="de-DE" dirty="0" err="1" smtClean="0"/>
-              <a:t>editors</a:t>
-            </a:r>
-            <a:r>
-              <a:rPr lang="de-DE" dirty="0" smtClean="0"/>
-              <a:t> / </a:t>
-            </a:r>
-            <a:r>
-              <a:rPr lang="de-DE" dirty="0" err="1" smtClean="0"/>
-              <a:t>input</a:t>
-            </a:r>
-            <a:endParaRPr lang="de-DE" dirty="0"/>
-          </a:p>
-        </p:txBody>
-      </p:sp>
-      <p:sp>
-        <p:nvSpPr>
-          <p:cNvPr id="21" name="TextBox 20"/>
-          <p:cNvSpPr txBox="1"/>
-          <p:nvPr/>
-        </p:nvSpPr>
-        <p:spPr>
-          <a:xfrm rot="16200000">
-            <a:off x="5811858" y="1978472"/>
-            <a:ext cx="1824217" cy="369332"/>
-          </a:xfrm>
-          <a:prstGeom prst="rect">
-            <a:avLst/>
-          </a:prstGeom>
-          <a:noFill/>
-        </p:spPr>
-        <p:txBody>
-          <a:bodyPr wrap="none" rtlCol="0">
-            <a:spAutoFit/>
-          </a:bodyPr>
-          <a:lstStyle/>
-          <a:p>
-            <a:r>
-              <a:rPr lang="de-DE" dirty="0" smtClean="0"/>
-              <a:t>Menu </a:t>
-            </a:r>
-            <a:r>
-              <a:rPr lang="de-DE" dirty="0" err="1" smtClean="0"/>
-              <a:t>commands</a:t>
-            </a:r>
-            <a:endParaRPr lang="de-DE" dirty="0"/>
-          </a:p>
-        </p:txBody>
-      </p:sp>
-      <p:sp>
-        <p:nvSpPr>
-          <p:cNvPr id="22" name="TextBox 21"/>
-          <p:cNvSpPr txBox="1"/>
-          <p:nvPr/>
-        </p:nvSpPr>
-        <p:spPr>
-          <a:xfrm rot="16200000">
-            <a:off x="6991899" y="1930165"/>
-            <a:ext cx="1930337" cy="369332"/>
-          </a:xfrm>
-          <a:prstGeom prst="rect">
-            <a:avLst/>
-          </a:prstGeom>
-          <a:noFill/>
-        </p:spPr>
-        <p:txBody>
-          <a:bodyPr wrap="none" rtlCol="0">
-            <a:spAutoFit/>
-          </a:bodyPr>
-          <a:lstStyle/>
-          <a:p>
-            <a:r>
-              <a:rPr lang="de-DE" dirty="0" err="1" smtClean="0"/>
-              <a:t>Supporting</a:t>
-            </a:r>
-            <a:r>
-              <a:rPr lang="de-DE" dirty="0" smtClean="0"/>
-              <a:t> </a:t>
-            </a:r>
-            <a:r>
-              <a:rPr lang="de-DE" dirty="0" err="1" smtClean="0"/>
-              <a:t>dialogs</a:t>
             </a:r>
             <a:endParaRPr lang="de-DE" dirty="0"/>
           </a:p>
@@ -10504,11 +10717,7 @@
             <a:pPr lvl="1"/>
             <a:r>
               <a:rPr lang="en-US" dirty="0" smtClean="0"/>
-              <a:t>Do not use the change mechanism </a:t>
-            </a:r>
-            <a:r>
-              <a:rPr lang="en-US" dirty="0" smtClean="0"/>
-              <a:t>in model parts</a:t>
+              <a:t>Do not use the change mechanism in model parts</a:t>
             </a:r>
           </a:p>
           <a:p>

</xml_diff>